<commit_message>
changed demo module name
</commit_message>
<xml_diff>
--- a/Powershell is Awesome.pptx
+++ b/Powershell is Awesome.pptx
@@ -6333,7 +6333,7 @@
           <a:p>
             <a:r>
               <a:rPr lang="en-US" dirty="0" smtClean="0"/>
-              <a:t>Demo</a:t>
+              <a:t>Code</a:t>
             </a:r>
             <a:endParaRPr lang="en-US" dirty="0"/>
           </a:p>
@@ -6746,11 +6746,7 @@
             </a:r>
             <a:r>
               <a:rPr lang="en-US" dirty="0" smtClean="0"/>
-              <a:t>owershell is a journey. Each and every one of </a:t>
-            </a:r>
-            <a:r>
-              <a:rPr lang="en-US" dirty="0" smtClean="0"/>
-              <a:t>us is at a different point in that journey. Knowing the path forward can often be the most challenging part if you don’t have a guide. </a:t>
+              <a:t>owershell is a journey. Each and every one of us is at a different point in that journey. Knowing the path forward can often be the most challenging part if you don’t have a guide. </a:t>
             </a:r>
             <a:endParaRPr lang="en-US" dirty="0"/>
           </a:p>
@@ -6833,11 +6829,7 @@
           <a:p>
             <a:r>
               <a:rPr lang="en-US" dirty="0"/>
-              <a:t> </a:t>
-            </a:r>
-            <a:r>
-              <a:rPr lang="en-US" dirty="0"/>
-              <a:t>The </a:t>
+              <a:t> The </a:t>
             </a:r>
             <a:r>
               <a:rPr lang="en-US" dirty="0" smtClean="0"/>
@@ -6978,11 +6970,7 @@
           <a:p>
             <a:r>
               <a:rPr lang="en-US" dirty="0"/>
-              <a:t> </a:t>
-            </a:r>
-            <a:r>
-              <a:rPr lang="en-US" dirty="0"/>
-              <a:t>The </a:t>
+              <a:t> The </a:t>
             </a:r>
             <a:r>
               <a:rPr lang="en-US" dirty="0" smtClean="0"/>

</xml_diff>